<commit_message>
Changes for the timetable
</commit_message>
<xml_diff>
--- a/comp9323-presentation.pptx
+++ b/comp9323-presentation.pptx
@@ -15098,6 +15098,24 @@
           <a:ln>
             <a:noFill/>
           </a:ln>
+          <a:effectLst>
+            <a:outerShdw blurRad="44450" dist="27940" dir="5400000" algn="ctr">
+              <a:srgbClr val="000000">
+                <a:alpha val="32000"/>
+              </a:srgbClr>
+            </a:outerShdw>
+          </a:effectLst>
+          <a:scene3d>
+            <a:camera prst="orthographicFront">
+              <a:rot lat="0" lon="0" rev="0"/>
+            </a:camera>
+            <a:lightRig rig="balanced" dir="t">
+              <a:rot lat="0" lon="0" rev="8700000"/>
+            </a:lightRig>
+          </a:scene3d>
+          <a:sp3d>
+            <a:bevelT w="190500" h="38100"/>
+          </a:sp3d>
         </p:spPr>
         <p:txBody>
           <a:bodyPr wrap="square" lIns="91425" tIns="45700" rIns="91425" bIns="45700" anchor="b" anchorCtr="0">
@@ -15120,7 +15138,7 @@
               <a:buNone/>
             </a:pPr>
             <a:r>
-              <a:rPr lang="en-US" sz="6000" b="0" i="0" u="none" strike="noStrike" cap="none">
+              <a:rPr lang="en-US" sz="6000" b="0" i="0" u="none" strike="noStrike" cap="none" dirty="0" err="1">
                 <a:solidFill>
                   <a:srgbClr val="FF0000"/>
                 </a:solidFill>
@@ -15131,6 +15149,15 @@
               </a:rPr>
               <a:t>Chappie</a:t>
             </a:r>
+            <a:endParaRPr lang="en-US" sz="6000" b="0" i="0" u="none" strike="noStrike" cap="none" dirty="0">
+              <a:solidFill>
+                <a:srgbClr val="FF0000"/>
+              </a:solidFill>
+              <a:latin typeface="Calibri"/>
+              <a:ea typeface="Calibri"/>
+              <a:cs typeface="Calibri"/>
+              <a:sym typeface="Calibri"/>
+            </a:endParaRPr>
           </a:p>
         </p:txBody>
       </p:sp>
@@ -15156,6 +15183,24 @@
           <a:ln>
             <a:noFill/>
           </a:ln>
+          <a:effectLst>
+            <a:outerShdw blurRad="44450" dist="27940" dir="5400000" algn="ctr">
+              <a:srgbClr val="000000">
+                <a:alpha val="32000"/>
+              </a:srgbClr>
+            </a:outerShdw>
+          </a:effectLst>
+          <a:scene3d>
+            <a:camera prst="orthographicFront">
+              <a:rot lat="0" lon="0" rev="0"/>
+            </a:camera>
+            <a:lightRig rig="balanced" dir="t">
+              <a:rot lat="0" lon="0" rev="8700000"/>
+            </a:lightRig>
+          </a:scene3d>
+          <a:sp3d>
+            <a:bevelT w="190500" h="38100"/>
+          </a:sp3d>
         </p:spPr>
         <p:txBody>
           <a:bodyPr wrap="square" lIns="91425" tIns="45700" rIns="91425" bIns="45700" anchor="t" anchorCtr="0">
@@ -15178,7 +15223,7 @@
               <a:buNone/>
             </a:pPr>
             <a:r>
-              <a:rPr lang="en-US" sz="2400">
+              <a:rPr lang="en-US" sz="2400" dirty="0">
                 <a:solidFill>
                   <a:srgbClr val="000000"/>
                 </a:solidFill>
@@ -15235,6 +15280,27 @@
           <a:prstGeom prst="rect">
             <a:avLst/>
           </a:prstGeom>
+          <a:ln>
+            <a:noFill/>
+          </a:ln>
+          <a:effectLst>
+            <a:outerShdw blurRad="44450" dist="27940" dir="5400000" algn="ctr">
+              <a:srgbClr val="000000">
+                <a:alpha val="32000"/>
+              </a:srgbClr>
+            </a:outerShdw>
+          </a:effectLst>
+          <a:scene3d>
+            <a:camera prst="orthographicFront">
+              <a:rot lat="0" lon="0" rev="0"/>
+            </a:camera>
+            <a:lightRig rig="balanced" dir="t">
+              <a:rot lat="0" lon="0" rev="8700000"/>
+            </a:lightRig>
+          </a:scene3d>
+          <a:sp3d>
+            <a:bevelT w="190500" h="38100"/>
+          </a:sp3d>
         </p:spPr>
         <p:txBody>
           <a:bodyPr wrap="square" lIns="121900" tIns="121900" rIns="121900" bIns="121900" anchor="t" anchorCtr="0">
@@ -15249,7 +15315,7 @@
               <a:buNone/>
             </a:pPr>
             <a:r>
-              <a:rPr lang="en-US"/>
+              <a:rPr lang="en-US" dirty="0"/>
               <a:t>Outline</a:t>
             </a:r>
           </a:p>
@@ -15267,12 +15333,33 @@
         </p:nvSpPr>
         <p:spPr>
           <a:xfrm>
-            <a:off x="1092200" y="2654300"/>
+            <a:off x="998894" y="2103794"/>
             <a:ext cx="10007700" cy="3264000"/>
           </a:xfrm>
           <a:prstGeom prst="rect">
             <a:avLst/>
           </a:prstGeom>
+          <a:ln>
+            <a:noFill/>
+          </a:ln>
+          <a:effectLst>
+            <a:outerShdw blurRad="44450" dist="27940" dir="5400000" algn="ctr">
+              <a:srgbClr val="000000">
+                <a:alpha val="32000"/>
+              </a:srgbClr>
+            </a:outerShdw>
+          </a:effectLst>
+          <a:scene3d>
+            <a:camera prst="orthographicFront">
+              <a:rot lat="0" lon="0" rev="0"/>
+            </a:camera>
+            <a:lightRig rig="balanced" dir="t">
+              <a:rot lat="0" lon="0" rev="8700000"/>
+            </a:lightRig>
+          </a:scene3d>
+          <a:sp3d>
+            <a:bevelT w="190500" h="38100"/>
+          </a:sp3d>
         </p:spPr>
         <p:txBody>
           <a:bodyPr wrap="square" lIns="121900" tIns="121900" rIns="121900" bIns="121900" anchor="t" anchorCtr="0">
@@ -15287,7 +15374,7 @@
               <a:buSzPct val="100000"/>
             </a:pPr>
             <a:r>
-              <a:rPr lang="en-US" sz="2400"/>
+              <a:rPr lang="en-US" sz="2400" dirty="0"/>
               <a:t>Problem Definition</a:t>
             </a:r>
           </a:p>
@@ -15299,7 +15386,7 @@
               <a:buSzPct val="100000"/>
             </a:pPr>
             <a:r>
-              <a:rPr lang="en-US" sz="2400"/>
+              <a:rPr lang="en-US" sz="2400" dirty="0"/>
               <a:t>Proposed Solution</a:t>
             </a:r>
           </a:p>
@@ -15311,7 +15398,7 @@
               <a:buSzPct val="100000"/>
             </a:pPr>
             <a:r>
-              <a:rPr lang="en-US" sz="2400"/>
+              <a:rPr lang="en-US" sz="2400" dirty="0"/>
               <a:t>Front-End Implementation</a:t>
             </a:r>
           </a:p>
@@ -15323,7 +15410,7 @@
               <a:buSzPct val="100000"/>
             </a:pPr>
             <a:r>
-              <a:rPr lang="en-US" sz="2400"/>
+              <a:rPr lang="en-US" sz="2400" dirty="0"/>
               <a:t>Back-End Implementation</a:t>
             </a:r>
           </a:p>
@@ -15335,7 +15422,7 @@
               <a:buSzPct val="100000"/>
             </a:pPr>
             <a:r>
-              <a:rPr lang="en-US" sz="2400"/>
+              <a:rPr lang="en-US" sz="2400" dirty="0"/>
               <a:t>Architecture</a:t>
             </a:r>
           </a:p>
@@ -15346,7 +15433,7 @@
               </a:spcBef>
               <a:buNone/>
             </a:pPr>
-            <a:endParaRPr/>
+            <a:endParaRPr dirty="0"/>
           </a:p>
         </p:txBody>
       </p:sp>
@@ -15813,22 +15900,10 @@
                 <a:cs typeface="Calibri"/>
                 <a:sym typeface="Calibri"/>
               </a:rPr>
-              <a:t>. </a:t>
+              <a:t>. pre-requisites/</a:t>
             </a:r>
             <a:r>
-              <a:rPr lang="en-US" sz="1200" dirty="0" smtClean="0">
-                <a:solidFill>
-                  <a:schemeClr val="dk2"/>
-                </a:solidFill>
-                <a:latin typeface="+mn-lt"/>
-                <a:ea typeface="Calibri"/>
-                <a:cs typeface="Calibri"/>
-                <a:sym typeface="Calibri"/>
-              </a:rPr>
-              <a:t>pre-requisites/</a:t>
-            </a:r>
-            <a:r>
-              <a:rPr lang="en-US" sz="1200" dirty="0" err="1" smtClean="0">
+              <a:rPr lang="en-US" sz="1200" dirty="0" err="1">
                 <a:solidFill>
                   <a:schemeClr val="dk2"/>
                 </a:solidFill>
@@ -16985,7 +17060,7 @@
           <p:cNvPr id="3" name="Picture 2">
             <a:extLst>
               <a:ext uri="{FF2B5EF4-FFF2-40B4-BE49-F238E27FC236}">
-                <a16:creationId xmlns="" xmlns:a16="http://schemas.microsoft.com/office/drawing/2014/main" id="{925BD36D-8588-4C76-8D64-513240649381}"/>
+                <a16:creationId xmlns:a16="http://schemas.microsoft.com/office/drawing/2014/main" id="{925BD36D-8588-4C76-8D64-513240649381}"/>
               </a:ext>
             </a:extLst>
           </p:cNvPr>
@@ -17015,7 +17090,7 @@
           <p:cNvPr id="11" name="Picture 10">
             <a:extLst>
               <a:ext uri="{FF2B5EF4-FFF2-40B4-BE49-F238E27FC236}">
-                <a16:creationId xmlns="" xmlns:a16="http://schemas.microsoft.com/office/drawing/2014/main" id="{21F664CB-FBD8-4185-9D82-3998D6FD79F4}"/>
+                <a16:creationId xmlns:a16="http://schemas.microsoft.com/office/drawing/2014/main" id="{21F664CB-FBD8-4185-9D82-3998D6FD79F4}"/>
               </a:ext>
             </a:extLst>
           </p:cNvPr>
@@ -17045,7 +17120,7 @@
           <p:cNvPr id="15" name="Picture 14">
             <a:extLst>
               <a:ext uri="{FF2B5EF4-FFF2-40B4-BE49-F238E27FC236}">
-                <a16:creationId xmlns="" xmlns:a16="http://schemas.microsoft.com/office/drawing/2014/main" id="{BE9937CB-5D51-4C5F-B126-40CD6020CE8D}"/>
+                <a16:creationId xmlns:a16="http://schemas.microsoft.com/office/drawing/2014/main" id="{BE9937CB-5D51-4C5F-B126-40CD6020CE8D}"/>
               </a:ext>
             </a:extLst>
           </p:cNvPr>
@@ -17075,7 +17150,7 @@
           <p:cNvPr id="19" name="Picture 18">
             <a:extLst>
               <a:ext uri="{FF2B5EF4-FFF2-40B4-BE49-F238E27FC236}">
-                <a16:creationId xmlns="" xmlns:a16="http://schemas.microsoft.com/office/drawing/2014/main" id="{8A1BDA48-DAC3-4776-8500-4E932A3179DC}"/>
+                <a16:creationId xmlns:a16="http://schemas.microsoft.com/office/drawing/2014/main" id="{8A1BDA48-DAC3-4776-8500-4E932A3179DC}"/>
               </a:ext>
             </a:extLst>
           </p:cNvPr>
@@ -17105,7 +17180,7 @@
           <p:cNvPr id="21" name="Connector: Curved 20">
             <a:extLst>
               <a:ext uri="{FF2B5EF4-FFF2-40B4-BE49-F238E27FC236}">
-                <a16:creationId xmlns="" xmlns:a16="http://schemas.microsoft.com/office/drawing/2014/main" id="{2FC5B3C7-A438-414B-B079-F2F14B5B8D76}"/>
+                <a16:creationId xmlns:a16="http://schemas.microsoft.com/office/drawing/2014/main" id="{2FC5B3C7-A438-414B-B079-F2F14B5B8D76}"/>
               </a:ext>
             </a:extLst>
           </p:cNvPr>
@@ -17149,7 +17224,7 @@
           <p:cNvPr id="23" name="Connector: Curved 22">
             <a:extLst>
               <a:ext uri="{FF2B5EF4-FFF2-40B4-BE49-F238E27FC236}">
-                <a16:creationId xmlns="" xmlns:a16="http://schemas.microsoft.com/office/drawing/2014/main" id="{393A4730-35FA-4832-BA50-734C1B438D8B}"/>
+                <a16:creationId xmlns:a16="http://schemas.microsoft.com/office/drawing/2014/main" id="{393A4730-35FA-4832-BA50-734C1B438D8B}"/>
               </a:ext>
             </a:extLst>
           </p:cNvPr>
@@ -17193,7 +17268,7 @@
           <p:cNvPr id="25" name="Connector: Curved 24">
             <a:extLst>
               <a:ext uri="{FF2B5EF4-FFF2-40B4-BE49-F238E27FC236}">
-                <a16:creationId xmlns="" xmlns:a16="http://schemas.microsoft.com/office/drawing/2014/main" id="{7DA0DC4F-C4EA-412A-8611-D34FB71CD1C4}"/>
+                <a16:creationId xmlns:a16="http://schemas.microsoft.com/office/drawing/2014/main" id="{7DA0DC4F-C4EA-412A-8611-D34FB71CD1C4}"/>
               </a:ext>
             </a:extLst>
           </p:cNvPr>
@@ -17237,7 +17312,7 @@
           <p:cNvPr id="26" name="TextBox 25">
             <a:extLst>
               <a:ext uri="{FF2B5EF4-FFF2-40B4-BE49-F238E27FC236}">
-                <a16:creationId xmlns="" xmlns:a16="http://schemas.microsoft.com/office/drawing/2014/main" id="{79F6FC67-70BD-4246-874E-CDC812D08BED}"/>
+                <a16:creationId xmlns:a16="http://schemas.microsoft.com/office/drawing/2014/main" id="{79F6FC67-70BD-4246-874E-CDC812D08BED}"/>
               </a:ext>
             </a:extLst>
           </p:cNvPr>
@@ -17275,7 +17350,7 @@
           <p:cNvPr id="29" name="TextBox 28">
             <a:extLst>
               <a:ext uri="{FF2B5EF4-FFF2-40B4-BE49-F238E27FC236}">
-                <a16:creationId xmlns="" xmlns:a16="http://schemas.microsoft.com/office/drawing/2014/main" id="{7D8C648D-A1CC-4174-8C79-17A413F77EEE}"/>
+                <a16:creationId xmlns:a16="http://schemas.microsoft.com/office/drawing/2014/main" id="{7D8C648D-A1CC-4174-8C79-17A413F77EEE}"/>
               </a:ext>
             </a:extLst>
           </p:cNvPr>
@@ -17313,7 +17388,7 @@
           <p:cNvPr id="30" name="TextBox 29">
             <a:extLst>
               <a:ext uri="{FF2B5EF4-FFF2-40B4-BE49-F238E27FC236}">
-                <a16:creationId xmlns="" xmlns:a16="http://schemas.microsoft.com/office/drawing/2014/main" id="{E16F2879-E736-406F-8BA5-0AE0581B9EE7}"/>
+                <a16:creationId xmlns:a16="http://schemas.microsoft.com/office/drawing/2014/main" id="{E16F2879-E736-406F-8BA5-0AE0581B9EE7}"/>
               </a:ext>
             </a:extLst>
           </p:cNvPr>
@@ -17351,7 +17426,7 @@
           <p:cNvPr id="31" name="TextBox 30">
             <a:extLst>
               <a:ext uri="{FF2B5EF4-FFF2-40B4-BE49-F238E27FC236}">
-                <a16:creationId xmlns="" xmlns:a16="http://schemas.microsoft.com/office/drawing/2014/main" id="{E368AE6E-7767-4EF2-9278-7D634F5BAEF5}"/>
+                <a16:creationId xmlns:a16="http://schemas.microsoft.com/office/drawing/2014/main" id="{E368AE6E-7767-4EF2-9278-7D634F5BAEF5}"/>
               </a:ext>
             </a:extLst>
           </p:cNvPr>
@@ -17389,7 +17464,7 @@
           <p:cNvPr id="27" name="TextBox 26">
             <a:extLst>
               <a:ext uri="{FF2B5EF4-FFF2-40B4-BE49-F238E27FC236}">
-                <a16:creationId xmlns="" xmlns:a16="http://schemas.microsoft.com/office/drawing/2014/main" id="{2C052569-322D-410A-AD0D-85AC1BE9A8E4}"/>
+                <a16:creationId xmlns:a16="http://schemas.microsoft.com/office/drawing/2014/main" id="{2C052569-322D-410A-AD0D-85AC1BE9A8E4}"/>
               </a:ext>
             </a:extLst>
           </p:cNvPr>
@@ -17436,7 +17511,7 @@
           <p:cNvPr id="28" name="TextBox 27">
             <a:extLst>
               <a:ext uri="{FF2B5EF4-FFF2-40B4-BE49-F238E27FC236}">
-                <a16:creationId xmlns="" xmlns:a16="http://schemas.microsoft.com/office/drawing/2014/main" id="{1F8B5744-43CC-4D95-AFAC-D062E7BEF07E}"/>
+                <a16:creationId xmlns:a16="http://schemas.microsoft.com/office/drawing/2014/main" id="{1F8B5744-43CC-4D95-AFAC-D062E7BEF07E}"/>
               </a:ext>
             </a:extLst>
           </p:cNvPr>
@@ -17503,7 +17578,7 @@
           <p:cNvPr id="256" name="TextBox 255">
             <a:extLst>
               <a:ext uri="{FF2B5EF4-FFF2-40B4-BE49-F238E27FC236}">
-                <a16:creationId xmlns="" xmlns:a16="http://schemas.microsoft.com/office/drawing/2014/main" id="{908D6DB3-CFCC-4949-9690-D0913CE68812}"/>
+                <a16:creationId xmlns:a16="http://schemas.microsoft.com/office/drawing/2014/main" id="{908D6DB3-CFCC-4949-9690-D0913CE68812}"/>
               </a:ext>
             </a:extLst>
           </p:cNvPr>
@@ -17557,7 +17632,7 @@
           <p:cNvPr id="258" name="Connector: Curved 257">
             <a:extLst>
               <a:ext uri="{FF2B5EF4-FFF2-40B4-BE49-F238E27FC236}">
-                <a16:creationId xmlns="" xmlns:a16="http://schemas.microsoft.com/office/drawing/2014/main" id="{9422E1EB-925D-41C9-A752-28345953495F}"/>
+                <a16:creationId xmlns:a16="http://schemas.microsoft.com/office/drawing/2014/main" id="{9422E1EB-925D-41C9-A752-28345953495F}"/>
               </a:ext>
             </a:extLst>
           </p:cNvPr>
@@ -17601,7 +17676,7 @@
           <p:cNvPr id="260" name="Connector: Curved 259">
             <a:extLst>
               <a:ext uri="{FF2B5EF4-FFF2-40B4-BE49-F238E27FC236}">
-                <a16:creationId xmlns="" xmlns:a16="http://schemas.microsoft.com/office/drawing/2014/main" id="{B5853203-A161-4C9F-B057-602AF00412FB}"/>
+                <a16:creationId xmlns:a16="http://schemas.microsoft.com/office/drawing/2014/main" id="{B5853203-A161-4C9F-B057-602AF00412FB}"/>
               </a:ext>
             </a:extLst>
           </p:cNvPr>
@@ -17645,7 +17720,7 @@
           <p:cNvPr id="262" name="Connector: Curved 261">
             <a:extLst>
               <a:ext uri="{FF2B5EF4-FFF2-40B4-BE49-F238E27FC236}">
-                <a16:creationId xmlns="" xmlns:a16="http://schemas.microsoft.com/office/drawing/2014/main" id="{4E84E900-4FE9-4E7E-884A-37E7974E5456}"/>
+                <a16:creationId xmlns:a16="http://schemas.microsoft.com/office/drawing/2014/main" id="{4E84E900-4FE9-4E7E-884A-37E7974E5456}"/>
               </a:ext>
             </a:extLst>
           </p:cNvPr>
@@ -17689,7 +17764,7 @@
           <p:cNvPr id="263" name="TextBox 262">
             <a:extLst>
               <a:ext uri="{FF2B5EF4-FFF2-40B4-BE49-F238E27FC236}">
-                <a16:creationId xmlns="" xmlns:a16="http://schemas.microsoft.com/office/drawing/2014/main" id="{B903EB83-138D-43C5-B3F3-024A43592B6E}"/>
+                <a16:creationId xmlns:a16="http://schemas.microsoft.com/office/drawing/2014/main" id="{B903EB83-138D-43C5-B3F3-024A43592B6E}"/>
               </a:ext>
             </a:extLst>
           </p:cNvPr>
@@ -17787,7 +17862,7 @@
           <p:cNvPr id="264" name="TextBox 263">
             <a:extLst>
               <a:ext uri="{FF2B5EF4-FFF2-40B4-BE49-F238E27FC236}">
-                <a16:creationId xmlns="" xmlns:a16="http://schemas.microsoft.com/office/drawing/2014/main" id="{A79BB224-0C75-412E-A978-52C1FF3A7760}"/>
+                <a16:creationId xmlns:a16="http://schemas.microsoft.com/office/drawing/2014/main" id="{A79BB224-0C75-412E-A978-52C1FF3A7760}"/>
               </a:ext>
             </a:extLst>
           </p:cNvPr>
@@ -17916,7 +17991,7 @@
           <p:cNvPr id="268" name="Picture 267">
             <a:extLst>
               <a:ext uri="{FF2B5EF4-FFF2-40B4-BE49-F238E27FC236}">
-                <a16:creationId xmlns="" xmlns:a16="http://schemas.microsoft.com/office/drawing/2014/main" id="{95E86B1C-876B-4150-8C1A-5386214B18E7}"/>
+                <a16:creationId xmlns:a16="http://schemas.microsoft.com/office/drawing/2014/main" id="{95E86B1C-876B-4150-8C1A-5386214B18E7}"/>
               </a:ext>
             </a:extLst>
           </p:cNvPr>
@@ -17946,7 +18021,7 @@
           <p:cNvPr id="269" name="TextBox 268">
             <a:extLst>
               <a:ext uri="{FF2B5EF4-FFF2-40B4-BE49-F238E27FC236}">
-                <a16:creationId xmlns="" xmlns:a16="http://schemas.microsoft.com/office/drawing/2014/main" id="{F0E1AC7A-85C1-4C85-A254-99304C523DAF}"/>
+                <a16:creationId xmlns:a16="http://schemas.microsoft.com/office/drawing/2014/main" id="{F0E1AC7A-85C1-4C85-A254-99304C523DAF}"/>
               </a:ext>
             </a:extLst>
           </p:cNvPr>

</xml_diff>